<commit_message>
update week 02 labs and slides
</commit_message>
<xml_diff>
--- a/docs/Lectures/Week01/Week01_SoftwareInstallation.pptx
+++ b/docs/Lectures/Week01/Week01_SoftwareInstallation.pptx
@@ -365,7 +365,7 @@
           <a:p>
             <a:fld id="{ED291B17-9318-49DB-B28B-6E5994AE9581}" type="datetime1">
               <a:rPr lang="en-US" smtClean="0"/>
-              <a:t>1/2/2025</a:t>
+              <a:t>1/4/2025</a:t>
             </a:fld>
             <a:endParaRPr lang="en-US" dirty="0"/>
           </a:p>
@@ -568,7 +568,7 @@
           <a:p>
             <a:fld id="{2CED4963-E985-44C4-B8C4-FDD613B7C2F8}" type="datetime1">
               <a:rPr lang="en-US" smtClean="0"/>
-              <a:t>1/2/2025</a:t>
+              <a:t>1/4/2025</a:t>
             </a:fld>
             <a:endParaRPr lang="en-US" dirty="0"/>
           </a:p>
@@ -930,7 +930,7 @@
           <a:p>
             <a:fld id="{ED291B17-9318-49DB-B28B-6E5994AE9581}" type="datetime1">
               <a:rPr lang="en-US" smtClean="0"/>
-              <a:t>1/2/2025</a:t>
+              <a:t>1/4/2025</a:t>
             </a:fld>
             <a:endParaRPr lang="en-US" dirty="0"/>
           </a:p>
@@ -1127,7 +1127,7 @@
           <a:p>
             <a:fld id="{78DD82B9-B8EE-4375-B6FF-88FA6ABB15D9}" type="datetime1">
               <a:rPr lang="en-US" smtClean="0"/>
-              <a:t>1/2/2025</a:t>
+              <a:t>1/4/2025</a:t>
             </a:fld>
             <a:endParaRPr lang="en-US" dirty="0"/>
           </a:p>
@@ -1438,7 +1438,7 @@
           <a:p>
             <a:fld id="{B2497495-0637-405E-AE64-5CC7506D51F5}" type="datetime1">
               <a:rPr lang="en-US" smtClean="0"/>
-              <a:t>1/2/2025</a:t>
+              <a:t>1/4/2025</a:t>
             </a:fld>
             <a:endParaRPr lang="en-US" dirty="0"/>
           </a:p>
@@ -1691,7 +1691,7 @@
           <a:p>
             <a:fld id="{7BFFD690-9426-415D-8B65-26881E07B2D4}" type="datetime1">
               <a:rPr lang="en-US" smtClean="0"/>
-              <a:t>1/2/2025</a:t>
+              <a:t>1/4/2025</a:t>
             </a:fld>
             <a:endParaRPr lang="en-US" dirty="0"/>
           </a:p>
@@ -2113,7 +2113,7 @@
           <a:p>
             <a:fld id="{04C4989A-474C-40DE-95B9-011C28B71673}" type="datetime1">
               <a:rPr lang="en-US" smtClean="0"/>
-              <a:t>1/2/2025</a:t>
+              <a:t>1/4/2025</a:t>
             </a:fld>
             <a:endParaRPr lang="en-US" dirty="0"/>
           </a:p>
@@ -2236,7 +2236,7 @@
           <a:p>
             <a:fld id="{5DB4ED54-5B5E-4A04-93D3-5772E3CE3818}" type="datetime1">
               <a:rPr lang="en-US" smtClean="0"/>
-              <a:t>1/2/2025</a:t>
+              <a:t>1/4/2025</a:t>
             </a:fld>
             <a:endParaRPr lang="en-US" dirty="0"/>
           </a:p>
@@ -2331,7 +2331,7 @@
           <a:p>
             <a:fld id="{4EDE50D6-574B-40AF-946F-D52A04ADE379}" type="datetime1">
               <a:rPr lang="en-US" smtClean="0"/>
-              <a:t>1/2/2025</a:t>
+              <a:t>1/4/2025</a:t>
             </a:fld>
             <a:endParaRPr lang="en-US" dirty="0"/>
           </a:p>
@@ -2708,7 +2708,7 @@
           <a:p>
             <a:fld id="{D82884F1-FFEA-405F-9602-3DCA865EDA4E}" type="datetime1">
               <a:rPr lang="en-US" smtClean="0"/>
-              <a:t>1/2/2025</a:t>
+              <a:t>1/4/2025</a:t>
             </a:fld>
             <a:endParaRPr lang="en-US" dirty="0"/>
           </a:p>
@@ -3001,7 +3001,7 @@
           <a:p>
             <a:fld id="{7E18DB4A-8810-4A10-AD5C-D5E2C667F5B3}" type="datetime1">
               <a:rPr lang="en-US" smtClean="0"/>
-              <a:t>1/2/2025</a:t>
+              <a:t>1/4/2025</a:t>
             </a:fld>
             <a:endParaRPr lang="en-US" dirty="0"/>
           </a:p>
@@ -3216,7 +3216,7 @@
           <a:p>
             <a:fld id="{ED291B17-9318-49DB-B28B-6E5994AE9581}" type="datetime1">
               <a:rPr lang="en-US" smtClean="0"/>
-              <a:t>1/2/2025</a:t>
+              <a:t>1/4/2025</a:t>
             </a:fld>
             <a:endParaRPr lang="en-US" dirty="0"/>
           </a:p>

</xml_diff>